<commit_message>
Update slides to include profile picture
</commit_message>
<xml_diff>
--- a/UsingSignalRtoEnhanceUXwithAngularJS.pptx
+++ b/UsingSignalRtoEnhanceUXwithAngularJS.pptx
@@ -5948,6 +5948,36 @@
           </a:p>
         </p:txBody>
       </p:sp>
+      <p:pic>
+        <p:nvPicPr>
+          <p:cNvPr id="3" name="Picture 2"/>
+          <p:cNvPicPr>
+            <a:picLocks noChangeAspect="1"/>
+          </p:cNvPicPr>
+          <p:nvPr/>
+        </p:nvPicPr>
+        <p:blipFill>
+          <a:blip r:embed="rId2">
+            <a:extLst>
+              <a:ext uri="{28A0092B-C50C-407E-A947-70E740481C1C}">
+                <a14:useLocalDpi xmlns:a14="http://schemas.microsoft.com/office/drawing/2010/main" val="0"/>
+              </a:ext>
+            </a:extLst>
+          </a:blip>
+          <a:stretch>
+            <a:fillRect/>
+          </a:stretch>
+        </p:blipFill>
+        <p:spPr>
+          <a:xfrm>
+            <a:off x="6285398" y="1930400"/>
+            <a:ext cx="2988604" cy="2988604"/>
+          </a:xfrm>
+          <a:prstGeom prst="rect">
+            <a:avLst/>
+          </a:prstGeom>
+        </p:spPr>
+      </p:pic>
     </p:spTree>
     <p:extLst>
       <p:ext uri="{BB962C8B-B14F-4D97-AF65-F5344CB8AC3E}">
@@ -6943,7 +6973,7 @@
       </p:sp>
       <p:sp>
         <p:nvSpPr>
-          <p:cNvPr id="3" name="Content Placeholder 2"/>
+          <p:cNvPr id="5" name="Content Placeholder 2"/>
           <p:cNvSpPr>
             <a:spLocks noGrp="1"/>
           </p:cNvSpPr>
@@ -7024,6 +7054,36 @@
           </a:p>
         </p:txBody>
       </p:sp>
+      <p:pic>
+        <p:nvPicPr>
+          <p:cNvPr id="6" name="Picture 5"/>
+          <p:cNvPicPr>
+            <a:picLocks noChangeAspect="1"/>
+          </p:cNvPicPr>
+          <p:nvPr/>
+        </p:nvPicPr>
+        <p:blipFill>
+          <a:blip r:embed="rId2">
+            <a:extLst>
+              <a:ext uri="{28A0092B-C50C-407E-A947-70E740481C1C}">
+                <a14:useLocalDpi xmlns:a14="http://schemas.microsoft.com/office/drawing/2010/main" val="0"/>
+              </a:ext>
+            </a:extLst>
+          </a:blip>
+          <a:stretch>
+            <a:fillRect/>
+          </a:stretch>
+        </p:blipFill>
+        <p:spPr>
+          <a:xfrm>
+            <a:off x="6285398" y="1930400"/>
+            <a:ext cx="2988604" cy="2988604"/>
+          </a:xfrm>
+          <a:prstGeom prst="rect">
+            <a:avLst/>
+          </a:prstGeom>
+        </p:spPr>
+      </p:pic>
     </p:spTree>
     <p:extLst>
       <p:ext uri="{BB962C8B-B14F-4D97-AF65-F5344CB8AC3E}">

</xml_diff>

<commit_message>
Update slides to fix typo in my title.
</commit_message>
<xml_diff>
--- a/UsingSignalRtoEnhanceUXwithAngularJS.pptx
+++ b/UsingSignalRtoEnhanceUXwithAngularJS.pptx
@@ -5904,7 +5904,11 @@
             </a:br>
             <a:r>
               <a:rPr lang="en-US" sz="2400" dirty="0" smtClean="0"/>
-              <a:t>Solution Architect</a:t>
+              <a:t>Solutions </a:t>
+            </a:r>
+            <a:r>
+              <a:rPr lang="en-US" sz="2400" dirty="0" smtClean="0"/>
+              <a:t>Architect</a:t>
             </a:r>
             <a:br>
               <a:rPr lang="en-US" sz="2400" dirty="0" smtClean="0"/>
@@ -7002,15 +7006,19 @@
               <a:t>Noren</a:t>
             </a:r>
             <a:r>
+              <a:rPr lang="en-US" sz="2400" smtClean="0"/>
+              <a:t/>
+            </a:r>
+            <a:br>
+              <a:rPr lang="en-US" sz="2400" smtClean="0"/>
+            </a:br>
+            <a:r>
+              <a:rPr lang="en-US" sz="2400" smtClean="0"/>
+              <a:t>Solutions </a:t>
+            </a:r>
+            <a:r>
               <a:rPr lang="en-US" sz="2400" dirty="0" smtClean="0"/>
-              <a:t/>
-            </a:r>
-            <a:br>
-              <a:rPr lang="en-US" sz="2400" dirty="0" smtClean="0"/>
-            </a:br>
-            <a:r>
-              <a:rPr lang="en-US" sz="2400" dirty="0" smtClean="0"/>
-              <a:t>Solution Architect</a:t>
+              <a:t>Architect</a:t>
             </a:r>
             <a:br>
               <a:rPr lang="en-US" sz="2400" dirty="0" smtClean="0"/>

</xml_diff>